<commit_message>
Slide added detailing Evaluation metrics.
Please note the third slide Animation is blank. I created it from the bullet point JRxD Animation in the document. Is anything intended to go in this section or should I remove it?
</commit_message>
<xml_diff>
--- a/JRxD.pptx
+++ b/JRxD.pptx
@@ -22,11 +22,12 @@
     <p:sldId id="268" r:id="rId16"/>
     <p:sldId id="269" r:id="rId17"/>
     <p:sldId id="270" r:id="rId18"/>
-    <p:sldId id="274" r:id="rId19"/>
-    <p:sldId id="279" r:id="rId20"/>
-    <p:sldId id="278" r:id="rId21"/>
-    <p:sldId id="280" r:id="rId22"/>
-    <p:sldId id="281" r:id="rId23"/>
+    <p:sldId id="282" r:id="rId19"/>
+    <p:sldId id="274" r:id="rId20"/>
+    <p:sldId id="279" r:id="rId21"/>
+    <p:sldId id="278" r:id="rId22"/>
+    <p:sldId id="280" r:id="rId23"/>
+    <p:sldId id="281" r:id="rId24"/>
   </p:sldIdLst>
   <p:sldSz cx="9144000" cy="6858000" type="screen4x3"/>
   <p:notesSz cx="6858000" cy="9144000"/>
@@ -310,7 +311,7 @@
             <a:fld id="{97E25779-4C65-4F29-9876-A93A7347158C}" type="datetimeFigureOut">
               <a:rPr lang="en-US" smtClean="0"/>
               <a:pPr/>
-              <a:t>4/7/2020</a:t>
+              <a:t>4/8/2020</a:t>
             </a:fld>
             <a:endParaRPr lang="en-US"/>
           </a:p>
@@ -477,7 +478,7 @@
             <a:fld id="{97E25779-4C65-4F29-9876-A93A7347158C}" type="datetimeFigureOut">
               <a:rPr lang="en-US" smtClean="0"/>
               <a:pPr/>
-              <a:t>4/7/2020</a:t>
+              <a:t>4/8/2020</a:t>
             </a:fld>
             <a:endParaRPr lang="en-US"/>
           </a:p>
@@ -654,7 +655,7 @@
             <a:fld id="{97E25779-4C65-4F29-9876-A93A7347158C}" type="datetimeFigureOut">
               <a:rPr lang="en-US" smtClean="0"/>
               <a:pPr/>
-              <a:t>4/7/2020</a:t>
+              <a:t>4/8/2020</a:t>
             </a:fld>
             <a:endParaRPr lang="en-US"/>
           </a:p>
@@ -821,7 +822,7 @@
             <a:fld id="{97E25779-4C65-4F29-9876-A93A7347158C}" type="datetimeFigureOut">
               <a:rPr lang="en-US" smtClean="0"/>
               <a:pPr/>
-              <a:t>4/7/2020</a:t>
+              <a:t>4/8/2020</a:t>
             </a:fld>
             <a:endParaRPr lang="en-US"/>
           </a:p>
@@ -1064,7 +1065,7 @@
             <a:fld id="{97E25779-4C65-4F29-9876-A93A7347158C}" type="datetimeFigureOut">
               <a:rPr lang="en-US" smtClean="0"/>
               <a:pPr/>
-              <a:t>4/7/2020</a:t>
+              <a:t>4/8/2020</a:t>
             </a:fld>
             <a:endParaRPr lang="en-US"/>
           </a:p>
@@ -1349,7 +1350,7 @@
             <a:fld id="{97E25779-4C65-4F29-9876-A93A7347158C}" type="datetimeFigureOut">
               <a:rPr lang="en-US" smtClean="0"/>
               <a:pPr/>
-              <a:t>4/7/2020</a:t>
+              <a:t>4/8/2020</a:t>
             </a:fld>
             <a:endParaRPr lang="en-US"/>
           </a:p>
@@ -1768,7 +1769,7 @@
             <a:fld id="{97E25779-4C65-4F29-9876-A93A7347158C}" type="datetimeFigureOut">
               <a:rPr lang="en-US" smtClean="0"/>
               <a:pPr/>
-              <a:t>4/7/2020</a:t>
+              <a:t>4/8/2020</a:t>
             </a:fld>
             <a:endParaRPr lang="en-US"/>
           </a:p>
@@ -1883,7 +1884,7 @@
             <a:fld id="{97E25779-4C65-4F29-9876-A93A7347158C}" type="datetimeFigureOut">
               <a:rPr lang="en-US" smtClean="0"/>
               <a:pPr/>
-              <a:t>4/7/2020</a:t>
+              <a:t>4/8/2020</a:t>
             </a:fld>
             <a:endParaRPr lang="en-US"/>
           </a:p>
@@ -1975,7 +1976,7 @@
             <a:fld id="{97E25779-4C65-4F29-9876-A93A7347158C}" type="datetimeFigureOut">
               <a:rPr lang="en-US" smtClean="0"/>
               <a:pPr/>
-              <a:t>4/7/2020</a:t>
+              <a:t>4/8/2020</a:t>
             </a:fld>
             <a:endParaRPr lang="en-US"/>
           </a:p>
@@ -2249,7 +2250,7 @@
             <a:fld id="{97E25779-4C65-4F29-9876-A93A7347158C}" type="datetimeFigureOut">
               <a:rPr lang="en-US" smtClean="0"/>
               <a:pPr/>
-              <a:t>4/7/2020</a:t>
+              <a:t>4/8/2020</a:t>
             </a:fld>
             <a:endParaRPr lang="en-US"/>
           </a:p>
@@ -2499,7 +2500,7 @@
             <a:fld id="{97E25779-4C65-4F29-9876-A93A7347158C}" type="datetimeFigureOut">
               <a:rPr lang="en-US" smtClean="0"/>
               <a:pPr/>
-              <a:t>4/7/2020</a:t>
+              <a:t>4/8/2020</a:t>
             </a:fld>
             <a:endParaRPr lang="en-US"/>
           </a:p>
@@ -2709,7 +2710,7 @@
             <a:fld id="{97E25779-4C65-4F29-9876-A93A7347158C}" type="datetimeFigureOut">
               <a:rPr lang="en-US" smtClean="0"/>
               <a:pPr/>
-              <a:t>4/7/2020</a:t>
+              <a:t>4/8/2020</a:t>
             </a:fld>
             <a:endParaRPr lang="en-US"/>
           </a:p>
@@ -3638,26 +3639,14 @@
             </a:pPr>
             <a:r>
               <a:rPr lang="en-US" sz="3100" dirty="0" smtClean="0"/>
-              <a:t>We’ll also need to specify several arguments to extract BOVW histogram representations from each image and store </a:t>
-            </a:r>
+              <a:t>We’ll also need to specify several arguments to extract BOVW histogram representations from each image and store in to the HDF5 dataset.</a:t>
+            </a:r>
+          </a:p>
+          <a:p>
+            <a:pPr lvl="0"/>
             <a:r>
               <a:rPr lang="en-US" sz="3100" dirty="0" smtClean="0"/>
-              <a:t>in to the </a:t>
-            </a:r>
-            <a:r>
-              <a:rPr lang="en-US" sz="3100" dirty="0" smtClean="0"/>
-              <a:t>HDF5 dataset.</a:t>
-            </a:r>
-          </a:p>
-          <a:p>
-            <a:pPr lvl="0"/>
-            <a:r>
-              <a:rPr lang="en-US" sz="3100" dirty="0" smtClean="0"/>
-              <a:t>‘-f’: The path to the HDF5 dataset </a:t>
-            </a:r>
-            <a:r>
-              <a:rPr lang="en-US" sz="3100" dirty="0" smtClean="0"/>
-              <a:t>containing the extracted </a:t>
+              <a:t>‘-f’: The path to the HDF5 dataset containing the extracted </a:t>
             </a:r>
             <a:r>
               <a:rPr lang="en-US" sz="3100" dirty="0" err="1" smtClean="0"/>
@@ -3665,11 +3654,7 @@
             </a:r>
             <a:r>
               <a:rPr lang="en-US" sz="3100" dirty="0" smtClean="0"/>
-              <a:t> </a:t>
-            </a:r>
-            <a:r>
-              <a:rPr lang="en-US" sz="3100" dirty="0" smtClean="0"/>
-              <a:t>and local invariant descriptors</a:t>
+              <a:t> and local invariant descriptors</a:t>
             </a:r>
           </a:p>
           <a:p>
@@ -3683,15 +3668,7 @@
             <a:pPr lvl="0"/>
             <a:r>
               <a:rPr lang="en-US" sz="3100" dirty="0" smtClean="0"/>
-              <a:t>‘-b’: The path </a:t>
-            </a:r>
-            <a:r>
-              <a:rPr lang="en-US" sz="3100" dirty="0" smtClean="0"/>
-              <a:t>of the </a:t>
-            </a:r>
-            <a:r>
-              <a:rPr lang="en-US" sz="3100" dirty="0" smtClean="0"/>
-              <a:t>HDF5 database storing the BOVW representations.</a:t>
+              <a:t>‘-b’: The path of the HDF5 database storing the BOVW representations.</a:t>
             </a:r>
           </a:p>
           <a:p>
@@ -4743,6 +4720,128 @@
 </file>
 
 <file path=ppt/slides/slide18.xml><?xml version="1.0" encoding="utf-8"?>
+<p:sld xmlns:a="http://schemas.openxmlformats.org/drawingml/2006/main" xmlns:r="http://schemas.openxmlformats.org/officeDocument/2006/relationships" xmlns:p="http://schemas.openxmlformats.org/presentationml/2006/main">
+  <p:cSld>
+    <p:spTree>
+      <p:nvGrpSpPr>
+        <p:cNvPr id="1" name=""/>
+        <p:cNvGrpSpPr/>
+        <p:nvPr/>
+      </p:nvGrpSpPr>
+      <p:grpSpPr>
+        <a:xfrm>
+          <a:off x="0" y="0"/>
+          <a:ext cx="0" cy="0"/>
+          <a:chOff x="0" y="0"/>
+          <a:chExt cx="0" cy="0"/>
+        </a:xfrm>
+      </p:grpSpPr>
+      <p:sp>
+        <p:nvSpPr>
+          <p:cNvPr id="2" name="Title 1"/>
+          <p:cNvSpPr>
+            <a:spLocks noGrp="1"/>
+          </p:cNvSpPr>
+          <p:nvPr>
+            <p:ph type="title"/>
+          </p:nvPr>
+        </p:nvSpPr>
+        <p:spPr/>
+        <p:txBody>
+          <a:bodyPr/>
+          <a:lstStyle/>
+          <a:p>
+            <a:r>
+              <a:rPr lang="en-US" dirty="0" smtClean="0"/>
+              <a:t>Evaluation</a:t>
+            </a:r>
+            <a:endParaRPr lang="en-US" dirty="0"/>
+          </a:p>
+        </p:txBody>
+      </p:sp>
+      <p:sp>
+        <p:nvSpPr>
+          <p:cNvPr id="3" name="Content Placeholder 2"/>
+          <p:cNvSpPr>
+            <a:spLocks noGrp="1"/>
+          </p:cNvSpPr>
+          <p:nvPr>
+            <p:ph idx="1"/>
+          </p:nvPr>
+        </p:nvSpPr>
+        <p:spPr/>
+        <p:txBody>
+          <a:bodyPr/>
+          <a:lstStyle/>
+          <a:p>
+            <a:pPr>
+              <a:buNone/>
+            </a:pPr>
+            <a:r>
+              <a:rPr lang="en-US" sz="2400" dirty="0" smtClean="0"/>
+              <a:t>Metric</a:t>
+            </a:r>
+          </a:p>
+          <a:p>
+            <a:pPr marL="0">
+              <a:buNone/>
+            </a:pPr>
+            <a:r>
+              <a:rPr lang="en-US" sz="2400" dirty="0" smtClean="0"/>
+              <a:t>1 point for each relevant image in the top 4 results, so for example only one relevant image in the top 4 results gives 1 point whereas 4 relevant images in the top 4 results gives 4 points.</a:t>
+            </a:r>
+          </a:p>
+          <a:p>
+            <a:pPr>
+              <a:buNone/>
+            </a:pPr>
+            <a:endParaRPr lang="en-US" sz="2400" dirty="0" smtClean="0"/>
+          </a:p>
+          <a:p>
+            <a:pPr marL="0">
+              <a:buNone/>
+            </a:pPr>
+            <a:r>
+              <a:rPr lang="en-US" sz="2400" dirty="0" smtClean="0"/>
+              <a:t>This is the same scoring system as used by </a:t>
+            </a:r>
+            <a:r>
+              <a:rPr lang="en-US" sz="2400" dirty="0" err="1" smtClean="0"/>
+              <a:t>Nistér</a:t>
+            </a:r>
+            <a:r>
+              <a:rPr lang="en-US" sz="2400" dirty="0" smtClean="0"/>
+              <a:t> and </a:t>
+            </a:r>
+            <a:r>
+              <a:rPr lang="en-US" sz="2400" dirty="0" err="1" smtClean="0"/>
+              <a:t>Stewénius</a:t>
+            </a:r>
+            <a:r>
+              <a:rPr lang="en-US" sz="2400" dirty="0" smtClean="0"/>
+              <a:t> (the creators of the </a:t>
+            </a:r>
+            <a:r>
+              <a:rPr lang="en-US" sz="2400" dirty="0" err="1" smtClean="0"/>
+              <a:t>UKBench</a:t>
+            </a:r>
+            <a:r>
+              <a:rPr lang="en-US" sz="2400" dirty="0" smtClean="0"/>
+              <a:t> dataset) in their 2006 paper ‘Scalable Recognition with a Vocabulary Tree’.</a:t>
+            </a:r>
+            <a:endParaRPr lang="en-US" sz="2400" dirty="0"/>
+          </a:p>
+        </p:txBody>
+      </p:sp>
+    </p:spTree>
+  </p:cSld>
+  <p:clrMapOvr>
+    <a:masterClrMapping/>
+  </p:clrMapOvr>
+</p:sld>
+</file>
+
+<file path=ppt/slides/slide19.xml><?xml version="1.0" encoding="utf-8"?>
 <p:sld xmlns:a="http://schemas.openxmlformats.org/drawingml/2006/main" xmlns:r="http://schemas.openxmlformats.org/officeDocument/2006/relationships" xmlns:p="http://schemas.openxmlformats.org/presentationml/2006/main">
   <p:cSld>
     <p:spTree>
@@ -5958,7 +6057,132 @@
 </p:sld>
 </file>
 
-<file path=ppt/slides/slide19.xml><?xml version="1.0" encoding="utf-8"?>
+<file path=ppt/slides/slide2.xml><?xml version="1.0" encoding="utf-8"?>
+<p:sld xmlns:a="http://schemas.openxmlformats.org/drawingml/2006/main" xmlns:r="http://schemas.openxmlformats.org/officeDocument/2006/relationships" xmlns:p="http://schemas.openxmlformats.org/presentationml/2006/main">
+  <p:cSld>
+    <p:spTree>
+      <p:nvGrpSpPr>
+        <p:cNvPr id="1" name=""/>
+        <p:cNvGrpSpPr/>
+        <p:nvPr/>
+      </p:nvGrpSpPr>
+      <p:grpSpPr>
+        <a:xfrm>
+          <a:off x="0" y="0"/>
+          <a:ext cx="0" cy="0"/>
+          <a:chOff x="0" y="0"/>
+          <a:chExt cx="0" cy="0"/>
+        </a:xfrm>
+      </p:grpSpPr>
+      <p:sp>
+        <p:nvSpPr>
+          <p:cNvPr id="2" name="Title 1"/>
+          <p:cNvSpPr>
+            <a:spLocks noGrp="1"/>
+          </p:cNvSpPr>
+          <p:nvPr>
+            <p:ph type="title"/>
+          </p:nvPr>
+        </p:nvSpPr>
+        <p:spPr/>
+        <p:txBody>
+          <a:bodyPr/>
+          <a:lstStyle/>
+          <a:p>
+            <a:pPr lvl="0"/>
+            <a:r>
+              <a:rPr lang="en-US" b="1" dirty="0" smtClean="0"/>
+              <a:t>Introduction</a:t>
+            </a:r>
+            <a:endParaRPr lang="en-US" dirty="0"/>
+          </a:p>
+        </p:txBody>
+      </p:sp>
+      <p:sp>
+        <p:nvSpPr>
+          <p:cNvPr id="3" name="Content Placeholder 2"/>
+          <p:cNvSpPr>
+            <a:spLocks noGrp="1"/>
+          </p:cNvSpPr>
+          <p:nvPr>
+            <p:ph idx="1"/>
+          </p:nvPr>
+        </p:nvSpPr>
+        <p:spPr/>
+        <p:txBody>
+          <a:bodyPr>
+            <a:normAutofit fontScale="92500" lnSpcReduction="10000"/>
+          </a:bodyPr>
+          <a:lstStyle/>
+          <a:p>
+            <a:pPr>
+              <a:buNone/>
+            </a:pPr>
+            <a:r>
+              <a:rPr lang="en-US" dirty="0" smtClean="0"/>
+              <a:t>	</a:t>
+            </a:r>
+            <a:r>
+              <a:rPr lang="en-US" dirty="0" err="1" smtClean="0"/>
+              <a:t>JRxD</a:t>
+            </a:r>
+            <a:r>
+              <a:rPr lang="en-US" dirty="0" smtClean="0"/>
+              <a:t> </a:t>
+            </a:r>
+            <a:r>
+              <a:rPr lang="en-US" dirty="0"/>
+              <a:t>is a project based on python </a:t>
+            </a:r>
+            <a:r>
+              <a:rPr lang="en-US" dirty="0" smtClean="0"/>
+              <a:t>language development</a:t>
+            </a:r>
+            <a:r>
+              <a:rPr lang="en-US" dirty="0"/>
+              <a:t>. It is a search engine by example image search, used to find and retrieve all images that contain the content users submitted</a:t>
+            </a:r>
+            <a:r>
+              <a:rPr lang="en-US" dirty="0" smtClean="0"/>
+              <a:t>, and furthermore</a:t>
+            </a:r>
+            <a:r>
+              <a:rPr lang="en-US" dirty="0"/>
+              <a:t>, it also places the most relevant images at the top of the search results list. The project is based on UK Bench and Paris dataset and under maintenance. </a:t>
+            </a:r>
+            <a:r>
+              <a:rPr lang="en-US" dirty="0" smtClean="0"/>
+              <a:t>The currently </a:t>
+            </a:r>
+            <a:r>
+              <a:rPr lang="en-US" dirty="0"/>
+              <a:t>available version is v1.0.0.</a:t>
+            </a:r>
+          </a:p>
+          <a:p>
+            <a:pPr>
+              <a:buNone/>
+            </a:pPr>
+            <a:r>
+              <a:rPr lang="en-US" b="1" dirty="0"/>
+              <a:t> </a:t>
+            </a:r>
+            <a:endParaRPr lang="en-US" dirty="0"/>
+          </a:p>
+          <a:p>
+            <a:endParaRPr lang="en-US" dirty="0"/>
+          </a:p>
+        </p:txBody>
+      </p:sp>
+    </p:spTree>
+  </p:cSld>
+  <p:clrMapOvr>
+    <a:masterClrMapping/>
+  </p:clrMapOvr>
+</p:sld>
+</file>
+
+<file path=ppt/slides/slide20.xml><?xml version="1.0" encoding="utf-8"?>
 <p:sld xmlns:a="http://schemas.openxmlformats.org/drawingml/2006/main" xmlns:r="http://schemas.openxmlformats.org/officeDocument/2006/relationships" xmlns:p="http://schemas.openxmlformats.org/presentationml/2006/main">
   <p:cSld>
     <p:spTree>
@@ -6068,132 +6292,7 @@
 </p:sld>
 </file>
 
-<file path=ppt/slides/slide2.xml><?xml version="1.0" encoding="utf-8"?>
-<p:sld xmlns:a="http://schemas.openxmlformats.org/drawingml/2006/main" xmlns:r="http://schemas.openxmlformats.org/officeDocument/2006/relationships" xmlns:p="http://schemas.openxmlformats.org/presentationml/2006/main">
-  <p:cSld>
-    <p:spTree>
-      <p:nvGrpSpPr>
-        <p:cNvPr id="1" name=""/>
-        <p:cNvGrpSpPr/>
-        <p:nvPr/>
-      </p:nvGrpSpPr>
-      <p:grpSpPr>
-        <a:xfrm>
-          <a:off x="0" y="0"/>
-          <a:ext cx="0" cy="0"/>
-          <a:chOff x="0" y="0"/>
-          <a:chExt cx="0" cy="0"/>
-        </a:xfrm>
-      </p:grpSpPr>
-      <p:sp>
-        <p:nvSpPr>
-          <p:cNvPr id="2" name="Title 1"/>
-          <p:cNvSpPr>
-            <a:spLocks noGrp="1"/>
-          </p:cNvSpPr>
-          <p:nvPr>
-            <p:ph type="title"/>
-          </p:nvPr>
-        </p:nvSpPr>
-        <p:spPr/>
-        <p:txBody>
-          <a:bodyPr/>
-          <a:lstStyle/>
-          <a:p>
-            <a:pPr lvl="0"/>
-            <a:r>
-              <a:rPr lang="en-US" b="1" dirty="0" smtClean="0"/>
-              <a:t>Introduction</a:t>
-            </a:r>
-            <a:endParaRPr lang="en-US" dirty="0"/>
-          </a:p>
-        </p:txBody>
-      </p:sp>
-      <p:sp>
-        <p:nvSpPr>
-          <p:cNvPr id="3" name="Content Placeholder 2"/>
-          <p:cNvSpPr>
-            <a:spLocks noGrp="1"/>
-          </p:cNvSpPr>
-          <p:nvPr>
-            <p:ph idx="1"/>
-          </p:nvPr>
-        </p:nvSpPr>
-        <p:spPr/>
-        <p:txBody>
-          <a:bodyPr>
-            <a:normAutofit fontScale="92500" lnSpcReduction="10000"/>
-          </a:bodyPr>
-          <a:lstStyle/>
-          <a:p>
-            <a:pPr>
-              <a:buNone/>
-            </a:pPr>
-            <a:r>
-              <a:rPr lang="en-US" dirty="0" smtClean="0"/>
-              <a:t>	</a:t>
-            </a:r>
-            <a:r>
-              <a:rPr lang="en-US" dirty="0" err="1" smtClean="0"/>
-              <a:t>JRxD</a:t>
-            </a:r>
-            <a:r>
-              <a:rPr lang="en-US" dirty="0" smtClean="0"/>
-              <a:t> </a:t>
-            </a:r>
-            <a:r>
-              <a:rPr lang="en-US" dirty="0"/>
-              <a:t>is a project based on python </a:t>
-            </a:r>
-            <a:r>
-              <a:rPr lang="en-US" dirty="0" smtClean="0"/>
-              <a:t>language development</a:t>
-            </a:r>
-            <a:r>
-              <a:rPr lang="en-US" dirty="0"/>
-              <a:t>. It is a search engine by example image search, used to find and retrieve all images that contain the content users submitted</a:t>
-            </a:r>
-            <a:r>
-              <a:rPr lang="en-US" dirty="0" smtClean="0"/>
-              <a:t>, and furthermore</a:t>
-            </a:r>
-            <a:r>
-              <a:rPr lang="en-US" dirty="0"/>
-              <a:t>, it also places the most relevant images at the top of the search results list. The project is based on UK Bench and Paris dataset and under maintenance. </a:t>
-            </a:r>
-            <a:r>
-              <a:rPr lang="en-US" dirty="0" smtClean="0"/>
-              <a:t>The currently </a:t>
-            </a:r>
-            <a:r>
-              <a:rPr lang="en-US" dirty="0"/>
-              <a:t>available version is v1.0.0.</a:t>
-            </a:r>
-          </a:p>
-          <a:p>
-            <a:pPr>
-              <a:buNone/>
-            </a:pPr>
-            <a:r>
-              <a:rPr lang="en-US" b="1" dirty="0"/>
-              <a:t> </a:t>
-            </a:r>
-            <a:endParaRPr lang="en-US" dirty="0"/>
-          </a:p>
-          <a:p>
-            <a:endParaRPr lang="en-US" dirty="0"/>
-          </a:p>
-        </p:txBody>
-      </p:sp>
-    </p:spTree>
-  </p:cSld>
-  <p:clrMapOvr>
-    <a:masterClrMapping/>
-  </p:clrMapOvr>
-</p:sld>
-</file>
-
-<file path=ppt/slides/slide20.xml><?xml version="1.0" encoding="utf-8"?>
+<file path=ppt/slides/slide21.xml><?xml version="1.0" encoding="utf-8"?>
 <p:sld xmlns:a="http://schemas.openxmlformats.org/drawingml/2006/main" xmlns:r="http://schemas.openxmlformats.org/officeDocument/2006/relationships" xmlns:p="http://schemas.openxmlformats.org/presentationml/2006/main">
   <p:cSld>
     <p:spTree>
@@ -6316,7 +6415,7 @@
 </p:sld>
 </file>
 
-<file path=ppt/slides/slide21.xml><?xml version="1.0" encoding="utf-8"?>
+<file path=ppt/slides/slide22.xml><?xml version="1.0" encoding="utf-8"?>
 <p:sld xmlns:a="http://schemas.openxmlformats.org/drawingml/2006/main" xmlns:r="http://schemas.openxmlformats.org/officeDocument/2006/relationships" xmlns:p="http://schemas.openxmlformats.org/presentationml/2006/main">
   <p:cSld>
     <p:spTree>
@@ -6439,7 +6538,7 @@
 </p:sld>
 </file>
 
-<file path=ppt/slides/slide22.xml><?xml version="1.0" encoding="utf-8"?>
+<file path=ppt/slides/slide23.xml><?xml version="1.0" encoding="utf-8"?>
 <p:sld xmlns:a="http://schemas.openxmlformats.org/drawingml/2006/main" xmlns:r="http://schemas.openxmlformats.org/officeDocument/2006/relationships" xmlns:p="http://schemas.openxmlformats.org/presentationml/2006/main">
   <p:cSld>
     <p:spTree>

</xml_diff>